<commit_message>
presentation fixes, modify params again
</commit_message>
<xml_diff>
--- a/export/results.pptx
+++ b/export/results.pptx
@@ -7,6 +7,8 @@
   <p:sldIdLst>
     <p:sldId id="256" r:id="rId7"/>
     <p:sldId id="257" r:id="rId8"/>
+    <p:sldId id="258" r:id="rId9"/>
+    <p:sldId id="259" r:id="rId10"/>
   </p:sldIdLst>
   <p:sldSz cx="9144000" cy="6858000" type="screen4x3"/>
   <p:notesSz cx="6858000" cy="9144000"/>
@@ -3142,7 +3144,7 @@
               </a:defRPr>
             </a:pPr>
             <a:r>
-              <a:t>Austin Szatrowski | 2026-02-26</a:t>
+              <a:t>Austin Szatrowski | 2026-02-27</a:t>
             </a:r>
           </a:p>
         </p:txBody>
@@ -3165,9 +3167,45 @@
         <p:nvPr/>
       </p:nvGrpSpPr>
       <p:grpSpPr/>
+      <p:sp>
+        <p:nvSpPr>
+          <p:cNvPr id="2" name="TextBox 1"/>
+          <p:cNvSpPr txBox="1"/>
+          <p:nvPr/>
+        </p:nvSpPr>
+        <p:spPr>
+          <a:xfrm>
+            <a:off x="457200" y="228600"/>
+            <a:ext cx="7315200" cy="914400"/>
+          </a:xfrm>
+          <a:prstGeom prst="rect">
+            <a:avLst/>
+          </a:prstGeom>
+          <a:noFill/>
+        </p:spPr>
+        <p:txBody>
+          <a:bodyPr wrap="none">
+            <a:spAutoFit/>
+          </a:bodyPr>
+          <a:lstStyle/>
+          <a:p>
+            <a:pPr>
+              <a:defRPr sz="2000" b="1">
+                <a:solidFill>
+                  <a:srgbClr val="B3BDC7"/>
+                </a:solidFill>
+                <a:latin typeface="Helvetica Neue"/>
+              </a:defRPr>
+            </a:pPr>
+            <a:r>
+              <a:t>Curves don't separate at 5 generations</a:t>
+            </a:r>
+          </a:p>
+        </p:txBody>
+      </p:sp>
       <p:pic>
         <p:nvPicPr>
-          <p:cNvPr id="2" name="Picture 1" descr="h2_0.0001_b2_0.0_pc_0.5_gen_2_all.png"/>
+          <p:cNvPr id="3" name="Picture 2" descr="overlay_h2_0.0001_pc_1.0_gen_5_binned.png"/>
           <p:cNvPicPr>
             <a:picLocks noChangeAspect="1"/>
           </p:cNvPicPr>
@@ -3181,8 +3219,92 @@
         </p:blipFill>
         <p:spPr>
           <a:xfrm>
-            <a:off x="914400" y="914400"/>
-            <a:ext cx="7620000" cy="4572000"/>
+            <a:off x="914400" y="1371600"/>
+            <a:ext cx="7315200" cy="3657600"/>
+          </a:xfrm>
+          <a:prstGeom prst="rect">
+            <a:avLst/>
+          </a:prstGeom>
+        </p:spPr>
+      </p:pic>
+    </p:spTree>
+  </p:cSld>
+  <p:clrMapOvr>
+    <a:masterClrMapping/>
+  </p:clrMapOvr>
+</p:sld>
+</file>
+
+<file path=ppt/slides/slide3.xml><?xml version="1.0" encoding="utf-8"?>
+<p:sld xmlns:a="http://schemas.openxmlformats.org/drawingml/2006/main" xmlns:p="http://schemas.openxmlformats.org/presentationml/2006/main" xmlns:r="http://schemas.openxmlformats.org/officeDocument/2006/relationships">
+  <p:cSld>
+    <p:spTree>
+      <p:nvGrpSpPr>
+        <p:cNvPr id="1" name=""/>
+        <p:cNvGrpSpPr/>
+        <p:nvPr/>
+      </p:nvGrpSpPr>
+      <p:grpSpPr/>
+      <p:pic>
+        <p:nvPicPr>
+          <p:cNvPr id="2" name="Picture 1" descr="overlay_h2_0.0001_pc_1.0_gen_10_binned.png"/>
+          <p:cNvPicPr>
+            <a:picLocks noChangeAspect="1"/>
+          </p:cNvPicPr>
+          <p:nvPr/>
+        </p:nvPicPr>
+        <p:blipFill>
+          <a:blip r:embed="rId2"/>
+          <a:stretch>
+            <a:fillRect/>
+          </a:stretch>
+        </p:blipFill>
+        <p:spPr>
+          <a:xfrm>
+            <a:off x="914400" y="1828800"/>
+            <a:ext cx="7315200" cy="3657600"/>
+          </a:xfrm>
+          <a:prstGeom prst="rect">
+            <a:avLst/>
+          </a:prstGeom>
+        </p:spPr>
+      </p:pic>
+    </p:spTree>
+  </p:cSld>
+  <p:clrMapOvr>
+    <a:masterClrMapping/>
+  </p:clrMapOvr>
+</p:sld>
+</file>
+
+<file path=ppt/slides/slide4.xml><?xml version="1.0" encoding="utf-8"?>
+<p:sld xmlns:a="http://schemas.openxmlformats.org/drawingml/2006/main" xmlns:p="http://schemas.openxmlformats.org/presentationml/2006/main" xmlns:r="http://schemas.openxmlformats.org/officeDocument/2006/relationships">
+  <p:cSld>
+    <p:spTree>
+      <p:nvGrpSpPr>
+        <p:cNvPr id="1" name=""/>
+        <p:cNvGrpSpPr/>
+        <p:nvPr/>
+      </p:nvGrpSpPr>
+      <p:grpSpPr/>
+      <p:pic>
+        <p:nvPicPr>
+          <p:cNvPr id="2" name="Picture 1" descr="overlay_h2_0.0001_pc_1.0_gen_20_binned.png"/>
+          <p:cNvPicPr>
+            <a:picLocks noChangeAspect="1"/>
+          </p:cNvPicPr>
+          <p:nvPr/>
+        </p:nvPicPr>
+        <p:blipFill>
+          <a:blip r:embed="rId2"/>
+          <a:stretch>
+            <a:fillRect/>
+          </a:stretch>
+        </p:blipFill>
+        <p:spPr>
+          <a:xfrm>
+            <a:off x="914400" y="1828800"/>
+            <a:ext cx="7315200" cy="3657600"/>
           </a:xfrm>
           <a:prstGeom prst="rect">
             <a:avLst/>

</xml_diff>